<commit_message>
divs principales del home.html
</commit_message>
<xml_diff>
--- a/tarea.pptx
+++ b/tarea.pptx
@@ -252,7 +252,7 @@
           <a:p>
             <a:fld id="{ABAC8A60-A509-4A71-9C31-8A36EF534CD7}" type="datetimeFigureOut">
               <a:rPr lang="es-ES" smtClean="0"/>
-              <a:t>03/12/2022</a:t>
+              <a:t>02/01/2023</a:t>
             </a:fld>
             <a:endParaRPr lang="es-ES"/>
           </a:p>
@@ -422,7 +422,7 @@
           <a:p>
             <a:fld id="{ABAC8A60-A509-4A71-9C31-8A36EF534CD7}" type="datetimeFigureOut">
               <a:rPr lang="es-ES" smtClean="0"/>
-              <a:t>03/12/2022</a:t>
+              <a:t>02/01/2023</a:t>
             </a:fld>
             <a:endParaRPr lang="es-ES"/>
           </a:p>
@@ -602,7 +602,7 @@
           <a:p>
             <a:fld id="{ABAC8A60-A509-4A71-9C31-8A36EF534CD7}" type="datetimeFigureOut">
               <a:rPr lang="es-ES" smtClean="0"/>
-              <a:t>03/12/2022</a:t>
+              <a:t>02/01/2023</a:t>
             </a:fld>
             <a:endParaRPr lang="es-ES"/>
           </a:p>
@@ -772,7 +772,7 @@
           <a:p>
             <a:fld id="{ABAC8A60-A509-4A71-9C31-8A36EF534CD7}" type="datetimeFigureOut">
               <a:rPr lang="es-ES" smtClean="0"/>
-              <a:t>03/12/2022</a:t>
+              <a:t>02/01/2023</a:t>
             </a:fld>
             <a:endParaRPr lang="es-ES"/>
           </a:p>
@@ -1018,7 +1018,7 @@
           <a:p>
             <a:fld id="{ABAC8A60-A509-4A71-9C31-8A36EF534CD7}" type="datetimeFigureOut">
               <a:rPr lang="es-ES" smtClean="0"/>
-              <a:t>03/12/2022</a:t>
+              <a:t>02/01/2023</a:t>
             </a:fld>
             <a:endParaRPr lang="es-ES"/>
           </a:p>
@@ -1250,7 +1250,7 @@
           <a:p>
             <a:fld id="{ABAC8A60-A509-4A71-9C31-8A36EF534CD7}" type="datetimeFigureOut">
               <a:rPr lang="es-ES" smtClean="0"/>
-              <a:t>03/12/2022</a:t>
+              <a:t>02/01/2023</a:t>
             </a:fld>
             <a:endParaRPr lang="es-ES"/>
           </a:p>
@@ -1617,7 +1617,7 @@
           <a:p>
             <a:fld id="{ABAC8A60-A509-4A71-9C31-8A36EF534CD7}" type="datetimeFigureOut">
               <a:rPr lang="es-ES" smtClean="0"/>
-              <a:t>03/12/2022</a:t>
+              <a:t>02/01/2023</a:t>
             </a:fld>
             <a:endParaRPr lang="es-ES"/>
           </a:p>
@@ -1735,7 +1735,7 @@
           <a:p>
             <a:fld id="{ABAC8A60-A509-4A71-9C31-8A36EF534CD7}" type="datetimeFigureOut">
               <a:rPr lang="es-ES" smtClean="0"/>
-              <a:t>03/12/2022</a:t>
+              <a:t>02/01/2023</a:t>
             </a:fld>
             <a:endParaRPr lang="es-ES"/>
           </a:p>
@@ -1830,7 +1830,7 @@
           <a:p>
             <a:fld id="{ABAC8A60-A509-4A71-9C31-8A36EF534CD7}" type="datetimeFigureOut">
               <a:rPr lang="es-ES" smtClean="0"/>
-              <a:t>03/12/2022</a:t>
+              <a:t>02/01/2023</a:t>
             </a:fld>
             <a:endParaRPr lang="es-ES"/>
           </a:p>
@@ -2107,7 +2107,7 @@
           <a:p>
             <a:fld id="{ABAC8A60-A509-4A71-9C31-8A36EF534CD7}" type="datetimeFigureOut">
               <a:rPr lang="es-ES" smtClean="0"/>
-              <a:t>03/12/2022</a:t>
+              <a:t>02/01/2023</a:t>
             </a:fld>
             <a:endParaRPr lang="es-ES"/>
           </a:p>
@@ -2360,7 +2360,7 @@
           <a:p>
             <a:fld id="{ABAC8A60-A509-4A71-9C31-8A36EF534CD7}" type="datetimeFigureOut">
               <a:rPr lang="es-ES" smtClean="0"/>
-              <a:t>03/12/2022</a:t>
+              <a:t>02/01/2023</a:t>
             </a:fld>
             <a:endParaRPr lang="es-ES"/>
           </a:p>
@@ -2573,7 +2573,7 @@
           <a:p>
             <a:fld id="{ABAC8A60-A509-4A71-9C31-8A36EF534CD7}" type="datetimeFigureOut">
               <a:rPr lang="es-ES" smtClean="0"/>
-              <a:t>03/12/2022</a:t>
+              <a:t>02/01/2023</a:t>
             </a:fld>
             <a:endParaRPr lang="es-ES"/>
           </a:p>
@@ -5586,10 +5586,6 @@
               <a:rPr lang="es-ES" sz="2000" b="1" dirty="0"/>
               <a:t>,</a:t>
             </a:r>
-            <a:r>
-              <a:rPr lang="es-ES" sz="2000" b="1" dirty="0"/>
-              <a:t/>
-            </a:r>
             <a:br>
               <a:rPr lang="es-ES" sz="2000" b="1" dirty="0"/>
             </a:br>
@@ -6117,6 +6113,96 @@
           </a:prstGeom>
         </p:spPr>
       </p:pic>
+      <p:sp>
+        <p:nvSpPr>
+          <p:cNvPr id="27" name="CuadroTexto 26"/>
+          <p:cNvSpPr txBox="1"/>
+          <p:nvPr/>
+        </p:nvSpPr>
+        <p:spPr>
+          <a:xfrm>
+            <a:off x="2759242" y="0"/>
+            <a:ext cx="1652695" cy="646331"/>
+          </a:xfrm>
+          <a:prstGeom prst="rect">
+            <a:avLst/>
+          </a:prstGeom>
+          <a:noFill/>
+        </p:spPr>
+        <p:txBody>
+          <a:bodyPr wrap="square" rtlCol="0">
+            <a:spAutoFit/>
+          </a:bodyPr>
+          <a:lstStyle/>
+          <a:p>
+            <a:r>
+              <a:rPr lang="es-VE" dirty="0" smtClean="0"/>
+              <a:t>ENCABEZADO 15% ALTO</a:t>
+            </a:r>
+            <a:endParaRPr lang="es-ES" dirty="0"/>
+          </a:p>
+        </p:txBody>
+      </p:sp>
+      <p:sp>
+        <p:nvSpPr>
+          <p:cNvPr id="29" name="CuadroTexto 28"/>
+          <p:cNvSpPr txBox="1"/>
+          <p:nvPr/>
+        </p:nvSpPr>
+        <p:spPr>
+          <a:xfrm>
+            <a:off x="2759242" y="903923"/>
+            <a:ext cx="1652695" cy="646331"/>
+          </a:xfrm>
+          <a:prstGeom prst="rect">
+            <a:avLst/>
+          </a:prstGeom>
+          <a:noFill/>
+        </p:spPr>
+        <p:txBody>
+          <a:bodyPr wrap="square" rtlCol="0">
+            <a:spAutoFit/>
+          </a:bodyPr>
+          <a:lstStyle/>
+          <a:p>
+            <a:r>
+              <a:rPr lang="es-VE" dirty="0" smtClean="0"/>
+              <a:t>TITULO 10% ALTO</a:t>
+            </a:r>
+            <a:endParaRPr lang="es-ES" dirty="0"/>
+          </a:p>
+        </p:txBody>
+      </p:sp>
+      <p:sp>
+        <p:nvSpPr>
+          <p:cNvPr id="30" name="CuadroTexto 29"/>
+          <p:cNvSpPr txBox="1"/>
+          <p:nvPr/>
+        </p:nvSpPr>
+        <p:spPr>
+          <a:xfrm>
+            <a:off x="4579522" y="5532271"/>
+            <a:ext cx="2270022" cy="369332"/>
+          </a:xfrm>
+          <a:prstGeom prst="rect">
+            <a:avLst/>
+          </a:prstGeom>
+          <a:noFill/>
+        </p:spPr>
+        <p:txBody>
+          <a:bodyPr wrap="square" rtlCol="0">
+            <a:spAutoFit/>
+          </a:bodyPr>
+          <a:lstStyle/>
+          <a:p>
+            <a:r>
+              <a:rPr lang="es-VE" dirty="0" smtClean="0"/>
+              <a:t>CUERPO 75% ALTO</a:t>
+            </a:r>
+            <a:endParaRPr lang="es-ES" dirty="0"/>
+          </a:p>
+        </p:txBody>
+      </p:sp>
     </p:spTree>
     <p:extLst>
       <p:ext uri="{BB962C8B-B14F-4D97-AF65-F5344CB8AC3E}">

</xml_diff>